<commit_message>
Restructure: Change the SearchBar component to a SearchBarContainer component
</commit_message>
<xml_diff>
--- a/Structure of Ravenous project.pptx
+++ b/Structure of Ravenous project.pptx
@@ -104,6 +104,11 @@
       </a:defRPr>
     </a:lvl9pPr>
   </p:defaultTextStyle>
+  <p:extLst>
+    <p:ext uri="{EFAFB233-063F-42B5-8137-9DF3F51BA10A}">
+      <p15:sldGuideLst xmlns:p15="http://schemas.microsoft.com/office/powerpoint/2012/main"/>
+    </p:ext>
+  </p:extLst>
 </p:presentation>
 </file>
 
@@ -238,7 +243,7 @@
           <a:p>
             <a:fld id="{3E673A7D-C3E4-4972-A6BA-9EB7ED97BC13}" type="datetimeFigureOut">
               <a:rPr lang="en-SG" smtClean="0"/>
-              <a:t>6/8/2024</a:t>
+              <a:t>7/8/2024</a:t>
             </a:fld>
             <a:endParaRPr lang="en-SG"/>
           </a:p>
@@ -408,7 +413,7 @@
           <a:p>
             <a:fld id="{3E673A7D-C3E4-4972-A6BA-9EB7ED97BC13}" type="datetimeFigureOut">
               <a:rPr lang="en-SG" smtClean="0"/>
-              <a:t>6/8/2024</a:t>
+              <a:t>7/8/2024</a:t>
             </a:fld>
             <a:endParaRPr lang="en-SG"/>
           </a:p>
@@ -588,7 +593,7 @@
           <a:p>
             <a:fld id="{3E673A7D-C3E4-4972-A6BA-9EB7ED97BC13}" type="datetimeFigureOut">
               <a:rPr lang="en-SG" smtClean="0"/>
-              <a:t>6/8/2024</a:t>
+              <a:t>7/8/2024</a:t>
             </a:fld>
             <a:endParaRPr lang="en-SG"/>
           </a:p>
@@ -758,7 +763,7 @@
           <a:p>
             <a:fld id="{3E673A7D-C3E4-4972-A6BA-9EB7ED97BC13}" type="datetimeFigureOut">
               <a:rPr lang="en-SG" smtClean="0"/>
-              <a:t>6/8/2024</a:t>
+              <a:t>7/8/2024</a:t>
             </a:fld>
             <a:endParaRPr lang="en-SG"/>
           </a:p>
@@ -1004,7 +1009,7 @@
           <a:p>
             <a:fld id="{3E673A7D-C3E4-4972-A6BA-9EB7ED97BC13}" type="datetimeFigureOut">
               <a:rPr lang="en-SG" smtClean="0"/>
-              <a:t>6/8/2024</a:t>
+              <a:t>7/8/2024</a:t>
             </a:fld>
             <a:endParaRPr lang="en-SG"/>
           </a:p>
@@ -1236,7 +1241,7 @@
           <a:p>
             <a:fld id="{3E673A7D-C3E4-4972-A6BA-9EB7ED97BC13}" type="datetimeFigureOut">
               <a:rPr lang="en-SG" smtClean="0"/>
-              <a:t>6/8/2024</a:t>
+              <a:t>7/8/2024</a:t>
             </a:fld>
             <a:endParaRPr lang="en-SG"/>
           </a:p>
@@ -1603,7 +1608,7 @@
           <a:p>
             <a:fld id="{3E673A7D-C3E4-4972-A6BA-9EB7ED97BC13}" type="datetimeFigureOut">
               <a:rPr lang="en-SG" smtClean="0"/>
-              <a:t>6/8/2024</a:t>
+              <a:t>7/8/2024</a:t>
             </a:fld>
             <a:endParaRPr lang="en-SG"/>
           </a:p>
@@ -1721,7 +1726,7 @@
           <a:p>
             <a:fld id="{3E673A7D-C3E4-4972-A6BA-9EB7ED97BC13}" type="datetimeFigureOut">
               <a:rPr lang="en-SG" smtClean="0"/>
-              <a:t>6/8/2024</a:t>
+              <a:t>7/8/2024</a:t>
             </a:fld>
             <a:endParaRPr lang="en-SG"/>
           </a:p>
@@ -1816,7 +1821,7 @@
           <a:p>
             <a:fld id="{3E673A7D-C3E4-4972-A6BA-9EB7ED97BC13}" type="datetimeFigureOut">
               <a:rPr lang="en-SG" smtClean="0"/>
-              <a:t>6/8/2024</a:t>
+              <a:t>7/8/2024</a:t>
             </a:fld>
             <a:endParaRPr lang="en-SG"/>
           </a:p>
@@ -2093,7 +2098,7 @@
           <a:p>
             <a:fld id="{3E673A7D-C3E4-4972-A6BA-9EB7ED97BC13}" type="datetimeFigureOut">
               <a:rPr lang="en-SG" smtClean="0"/>
-              <a:t>6/8/2024</a:t>
+              <a:t>7/8/2024</a:t>
             </a:fld>
             <a:endParaRPr lang="en-SG"/>
           </a:p>
@@ -2350,7 +2355,7 @@
           <a:p>
             <a:fld id="{3E673A7D-C3E4-4972-A6BA-9EB7ED97BC13}" type="datetimeFigureOut">
               <a:rPr lang="en-SG" smtClean="0"/>
-              <a:t>6/8/2024</a:t>
+              <a:t>7/8/2024</a:t>
             </a:fld>
             <a:endParaRPr lang="en-SG"/>
           </a:p>
@@ -2563,7 +2568,7 @@
           <a:p>
             <a:fld id="{3E673A7D-C3E4-4972-A6BA-9EB7ED97BC13}" type="datetimeFigureOut">
               <a:rPr lang="en-SG" smtClean="0"/>
-              <a:t>6/8/2024</a:t>
+              <a:t>7/8/2024</a:t>
             </a:fld>
             <a:endParaRPr lang="en-SG"/>
           </a:p>
@@ -3539,10 +3544,10 @@
         </p:nvGrpSpPr>
         <p:grpSpPr>
           <a:xfrm>
-            <a:off x="1475864" y="1703932"/>
-            <a:ext cx="663964" cy="540000"/>
-            <a:chOff x="3100644" y="641480"/>
-            <a:chExt cx="606069" cy="492916"/>
+            <a:off x="1503916" y="1703932"/>
+            <a:ext cx="607860" cy="540000"/>
+            <a:chOff x="3126250" y="641480"/>
+            <a:chExt cx="554857" cy="492916"/>
           </a:xfrm>
         </p:grpSpPr>
         <p:sp>
@@ -3612,8 +3617,8 @@
           </p:nvSpPr>
           <p:spPr>
             <a:xfrm>
-              <a:off x="3100644" y="803655"/>
-              <a:ext cx="606069" cy="168564"/>
+              <a:off x="3126250" y="761513"/>
+              <a:ext cx="554857" cy="252847"/>
             </a:xfrm>
             <a:prstGeom prst="rect">
               <a:avLst/>
@@ -3628,16 +3633,36 @@
             <a:p>
               <a:pPr algn="ctr"/>
               <a:r>
-                <a:rPr lang="en-SG" sz="600" b="1" dirty="0"/>
+                <a:rPr lang="en-SG" sz="600" b="1" dirty="0">
+                  <a:solidFill>
+                    <a:srgbClr val="FF0000"/>
+                  </a:solidFill>
+                </a:rPr>
                 <a:t>&lt;</a:t>
               </a:r>
               <a:r>
-                <a:rPr lang="en-SG" sz="600" b="1" dirty="0" err="1"/>
+                <a:rPr lang="en-SG" sz="600" b="1" dirty="0" err="1">
+                  <a:solidFill>
+                    <a:srgbClr val="FF0000"/>
+                  </a:solidFill>
+                </a:rPr>
                 <a:t>SearchBar</a:t>
               </a:r>
+              <a:endParaRPr lang="en-SG" sz="600" b="1" dirty="0">
+                <a:solidFill>
+                  <a:srgbClr val="FF0000"/>
+                </a:solidFill>
+              </a:endParaRPr>
+            </a:p>
+            <a:p>
+              <a:pPr algn="ctr"/>
               <a:r>
-                <a:rPr lang="en-SG" sz="600" b="1" dirty="0"/>
-                <a:t>/&gt;</a:t>
+                <a:rPr lang="en-SG" sz="600" b="1" dirty="0">
+                  <a:solidFill>
+                    <a:srgbClr val="FF0000"/>
+                  </a:solidFill>
+                </a:rPr>
+                <a:t>Container/&gt;</a:t>
               </a:r>
             </a:p>
           </p:txBody>
@@ -3877,7 +3902,7 @@
         </p:nvGrpSpPr>
         <p:grpSpPr>
           <a:xfrm>
-            <a:off x="1034813" y="2496411"/>
+            <a:off x="1140824" y="2550756"/>
             <a:ext cx="622285" cy="540000"/>
             <a:chOff x="3119667" y="641480"/>
             <a:chExt cx="568024" cy="492916"/>
@@ -3998,7 +4023,7 @@
         </p:nvGrpSpPr>
         <p:grpSpPr>
           <a:xfrm>
-            <a:off x="1886338" y="3182935"/>
+            <a:off x="1862441" y="2567971"/>
             <a:ext cx="622286" cy="540000"/>
             <a:chOff x="3119668" y="641480"/>
             <a:chExt cx="568025" cy="492916"/>
@@ -4224,8 +4249,8 @@
         </p:nvCxnSpPr>
         <p:spPr>
           <a:xfrm rot="5400000">
-            <a:off x="1450660" y="2139226"/>
-            <a:ext cx="252479" cy="461891"/>
+            <a:off x="1476492" y="2219404"/>
+            <a:ext cx="306824" cy="355880"/>
           </a:xfrm>
           <a:prstGeom prst="curvedConnector3">
             <a:avLst>
@@ -4264,15 +4289,15 @@
           </p:cNvPr>
           <p:cNvCxnSpPr>
             <a:cxnSpLocks/>
-            <a:stCxn id="64" idx="4"/>
+            <a:stCxn id="19" idx="4"/>
             <a:endCxn id="31" idx="0"/>
           </p:cNvCxnSpPr>
           <p:nvPr/>
         </p:nvCxnSpPr>
         <p:spPr>
-          <a:xfrm rot="5400000">
-            <a:off x="2141785" y="3093725"/>
-            <a:ext cx="144903" cy="33517"/>
+          <a:xfrm rot="16200000" flipH="1">
+            <a:off x="1828693" y="2223083"/>
+            <a:ext cx="324039" cy="365736"/>
           </a:xfrm>
           <a:prstGeom prst="curvedConnector3">
             <a:avLst>
@@ -4508,194 +4533,6 @@
           <a:xfrm rot="5400000" flipH="1" flipV="1">
             <a:off x="3302767" y="2370158"/>
             <a:ext cx="252479" cy="28"/>
-          </a:xfrm>
-          <a:prstGeom prst="curvedConnector3">
-            <a:avLst>
-              <a:gd name="adj1" fmla="val 50000"/>
-            </a:avLst>
-          </a:prstGeom>
-          <a:ln>
-            <a:solidFill>
-              <a:srgbClr val="002060"/>
-            </a:solidFill>
-          </a:ln>
-        </p:spPr>
-        <p:style>
-          <a:lnRef idx="2">
-            <a:schemeClr val="accent1"/>
-          </a:lnRef>
-          <a:fillRef idx="0">
-            <a:schemeClr val="accent1"/>
-          </a:fillRef>
-          <a:effectRef idx="1">
-            <a:schemeClr val="accent1"/>
-          </a:effectRef>
-          <a:fontRef idx="minor">
-            <a:schemeClr val="tx1"/>
-          </a:fontRef>
-        </p:style>
-      </p:cxnSp>
-      <p:grpSp>
-        <p:nvGrpSpPr>
-          <p:cNvPr id="63" name="Group 62">
-            <a:extLst>
-              <a:ext uri="{FF2B5EF4-FFF2-40B4-BE49-F238E27FC236}">
-                <a16:creationId xmlns:a16="http://schemas.microsoft.com/office/drawing/2014/main" id="{3675473F-D847-7466-A5A5-32D7364B3DF2}"/>
-              </a:ext>
-            </a:extLst>
-          </p:cNvPr>
-          <p:cNvGrpSpPr/>
-          <p:nvPr/>
-        </p:nvGrpSpPr>
-        <p:grpSpPr>
-          <a:xfrm>
-            <a:off x="1927071" y="2498032"/>
-            <a:ext cx="607859" cy="540000"/>
-            <a:chOff x="3126255" y="641480"/>
-            <a:chExt cx="554856" cy="492916"/>
-          </a:xfrm>
-        </p:grpSpPr>
-        <p:sp>
-          <p:nvSpPr>
-            <p:cNvPr id="64" name="Oval 63">
-              <a:extLst>
-                <a:ext uri="{FF2B5EF4-FFF2-40B4-BE49-F238E27FC236}">
-                  <a16:creationId xmlns:a16="http://schemas.microsoft.com/office/drawing/2014/main" id="{220527A4-5C06-0CC5-204A-97AF2968C63D}"/>
-                </a:ext>
-              </a:extLst>
-            </p:cNvPr>
-            <p:cNvSpPr/>
-            <p:nvPr/>
-          </p:nvSpPr>
-          <p:spPr>
-            <a:xfrm>
-              <a:off x="3157219" y="641480"/>
-              <a:ext cx="492915" cy="492916"/>
-            </a:xfrm>
-            <a:prstGeom prst="ellipse">
-              <a:avLst/>
-            </a:prstGeom>
-            <a:solidFill>
-              <a:schemeClr val="bg1"/>
-            </a:solidFill>
-          </p:spPr>
-          <p:style>
-            <a:lnRef idx="2">
-              <a:schemeClr val="accent1">
-                <a:shade val="15000"/>
-              </a:schemeClr>
-            </a:lnRef>
-            <a:fillRef idx="1">
-              <a:schemeClr val="accent1"/>
-            </a:fillRef>
-            <a:effectRef idx="0">
-              <a:schemeClr val="accent1"/>
-            </a:effectRef>
-            <a:fontRef idx="minor">
-              <a:schemeClr val="lt1"/>
-            </a:fontRef>
-          </p:style>
-          <p:txBody>
-            <a:bodyPr rtlCol="0" anchor="ctr"/>
-            <a:lstStyle/>
-            <a:p>
-              <a:pPr algn="ctr"/>
-              <a:endParaRPr lang="en-SG" sz="400" b="1" dirty="0">
-                <a:solidFill>
-                  <a:srgbClr val="FF0000"/>
-                </a:solidFill>
-              </a:endParaRPr>
-            </a:p>
-          </p:txBody>
-        </p:sp>
-        <p:sp>
-          <p:nvSpPr>
-            <p:cNvPr id="65" name="TextBox 64">
-              <a:extLst>
-                <a:ext uri="{FF2B5EF4-FFF2-40B4-BE49-F238E27FC236}">
-                  <a16:creationId xmlns:a16="http://schemas.microsoft.com/office/drawing/2014/main" id="{A70AA60B-08D7-25C9-CBD1-1D1B8D6A66AC}"/>
-                </a:ext>
-              </a:extLst>
-            </p:cNvPr>
-            <p:cNvSpPr txBox="1"/>
-            <p:nvPr/>
-          </p:nvSpPr>
-          <p:spPr>
-            <a:xfrm>
-              <a:off x="3126255" y="719373"/>
-              <a:ext cx="554856" cy="337129"/>
-            </a:xfrm>
-            <a:prstGeom prst="rect">
-              <a:avLst/>
-            </a:prstGeom>
-            <a:noFill/>
-          </p:spPr>
-          <p:txBody>
-            <a:bodyPr wrap="none" rtlCol="0" anchor="ctr">
-              <a:spAutoFit/>
-            </a:bodyPr>
-            <a:lstStyle/>
-            <a:p>
-              <a:pPr algn="ctr"/>
-              <a:r>
-                <a:rPr lang="en-SG" sz="600" b="1" dirty="0">
-                  <a:solidFill>
-                    <a:srgbClr val="FF0000"/>
-                  </a:solidFill>
-                </a:rPr>
-                <a:t>&lt;Form</a:t>
-              </a:r>
-            </a:p>
-            <a:p>
-              <a:pPr algn="ctr"/>
-              <a:r>
-                <a:rPr lang="en-SG" sz="600" b="1" dirty="0" err="1">
-                  <a:solidFill>
-                    <a:srgbClr val="FF0000"/>
-                  </a:solidFill>
-                </a:rPr>
-                <a:t>SearchBar</a:t>
-              </a:r>
-              <a:endParaRPr lang="en-SG" sz="600" b="1" dirty="0">
-                <a:solidFill>
-                  <a:srgbClr val="FF0000"/>
-                </a:solidFill>
-              </a:endParaRPr>
-            </a:p>
-            <a:p>
-              <a:pPr algn="ctr"/>
-              <a:r>
-                <a:rPr lang="en-SG" sz="600" b="1" dirty="0">
-                  <a:solidFill>
-                    <a:srgbClr val="FF0000"/>
-                  </a:solidFill>
-                </a:rPr>
-                <a:t>Container/&gt;</a:t>
-              </a:r>
-            </a:p>
-          </p:txBody>
-        </p:sp>
-      </p:grpSp>
-      <p:cxnSp>
-        <p:nvCxnSpPr>
-          <p:cNvPr id="66" name="Connector: Curved 65">
-            <a:extLst>
-              <a:ext uri="{FF2B5EF4-FFF2-40B4-BE49-F238E27FC236}">
-                <a16:creationId xmlns:a16="http://schemas.microsoft.com/office/drawing/2014/main" id="{324B06C2-B737-9317-7471-FA32301A831F}"/>
-              </a:ext>
-            </a:extLst>
-          </p:cNvPr>
-          <p:cNvCxnSpPr>
-            <a:cxnSpLocks/>
-            <a:stCxn id="19" idx="4"/>
-            <a:endCxn id="64" idx="0"/>
-          </p:cNvCxnSpPr>
-          <p:nvPr/>
-        </p:nvCxnSpPr>
-        <p:spPr>
-          <a:xfrm rot="16200000" flipH="1">
-            <a:off x="1892369" y="2159407"/>
-            <a:ext cx="254100" cy="423150"/>
           </a:xfrm>
           <a:prstGeom prst="curvedConnector3">
             <a:avLst>

</xml_diff>